<commit_message>
Added Taxes to PPT
</commit_message>
<xml_diff>
--- a/docs/Database Logic.pptx
+++ b/docs/Database Logic.pptx
@@ -268,7 +268,7 @@
           <a:p>
             <a:fld id="{8E38A466-912F-4638-A4B7-9291465C9E2A}" type="datetimeFigureOut">
               <a:rPr lang="hr-HR" smtClean="0"/>
-              <a:t>26.01.2021.</a:t>
+              <a:t>30.01.2021.</a:t>
             </a:fld>
             <a:endParaRPr lang="hr-HR"/>
           </a:p>
@@ -468,7 +468,7 @@
           <a:p>
             <a:fld id="{8E38A466-912F-4638-A4B7-9291465C9E2A}" type="datetimeFigureOut">
               <a:rPr lang="hr-HR" smtClean="0"/>
-              <a:t>26.01.2021.</a:t>
+              <a:t>30.01.2021.</a:t>
             </a:fld>
             <a:endParaRPr lang="hr-HR"/>
           </a:p>
@@ -678,7 +678,7 @@
           <a:p>
             <a:fld id="{8E38A466-912F-4638-A4B7-9291465C9E2A}" type="datetimeFigureOut">
               <a:rPr lang="hr-HR" smtClean="0"/>
-              <a:t>26.01.2021.</a:t>
+              <a:t>30.01.2021.</a:t>
             </a:fld>
             <a:endParaRPr lang="hr-HR"/>
           </a:p>
@@ -878,7 +878,7 @@
           <a:p>
             <a:fld id="{8E38A466-912F-4638-A4B7-9291465C9E2A}" type="datetimeFigureOut">
               <a:rPr lang="hr-HR" smtClean="0"/>
-              <a:t>26.01.2021.</a:t>
+              <a:t>30.01.2021.</a:t>
             </a:fld>
             <a:endParaRPr lang="hr-HR"/>
           </a:p>
@@ -1154,7 +1154,7 @@
           <a:p>
             <a:fld id="{8E38A466-912F-4638-A4B7-9291465C9E2A}" type="datetimeFigureOut">
               <a:rPr lang="hr-HR" smtClean="0"/>
-              <a:t>26.01.2021.</a:t>
+              <a:t>30.01.2021.</a:t>
             </a:fld>
             <a:endParaRPr lang="hr-HR"/>
           </a:p>
@@ -1422,7 +1422,7 @@
           <a:p>
             <a:fld id="{8E38A466-912F-4638-A4B7-9291465C9E2A}" type="datetimeFigureOut">
               <a:rPr lang="hr-HR" smtClean="0"/>
-              <a:t>26.01.2021.</a:t>
+              <a:t>30.01.2021.</a:t>
             </a:fld>
             <a:endParaRPr lang="hr-HR"/>
           </a:p>
@@ -1837,7 +1837,7 @@
           <a:p>
             <a:fld id="{8E38A466-912F-4638-A4B7-9291465C9E2A}" type="datetimeFigureOut">
               <a:rPr lang="hr-HR" smtClean="0"/>
-              <a:t>26.01.2021.</a:t>
+              <a:t>30.01.2021.</a:t>
             </a:fld>
             <a:endParaRPr lang="hr-HR"/>
           </a:p>
@@ -1979,7 +1979,7 @@
           <a:p>
             <a:fld id="{8E38A466-912F-4638-A4B7-9291465C9E2A}" type="datetimeFigureOut">
               <a:rPr lang="hr-HR" smtClean="0"/>
-              <a:t>26.01.2021.</a:t>
+              <a:t>30.01.2021.</a:t>
             </a:fld>
             <a:endParaRPr lang="hr-HR"/>
           </a:p>
@@ -2092,7 +2092,7 @@
           <a:p>
             <a:fld id="{8E38A466-912F-4638-A4B7-9291465C9E2A}" type="datetimeFigureOut">
               <a:rPr lang="hr-HR" smtClean="0"/>
-              <a:t>26.01.2021.</a:t>
+              <a:t>30.01.2021.</a:t>
             </a:fld>
             <a:endParaRPr lang="hr-HR"/>
           </a:p>
@@ -2405,7 +2405,7 @@
           <a:p>
             <a:fld id="{8E38A466-912F-4638-A4B7-9291465C9E2A}" type="datetimeFigureOut">
               <a:rPr lang="hr-HR" smtClean="0"/>
-              <a:t>26.01.2021.</a:t>
+              <a:t>30.01.2021.</a:t>
             </a:fld>
             <a:endParaRPr lang="hr-HR"/>
           </a:p>
@@ -2694,7 +2694,7 @@
           <a:p>
             <a:fld id="{8E38A466-912F-4638-A4B7-9291465C9E2A}" type="datetimeFigureOut">
               <a:rPr lang="hr-HR" smtClean="0"/>
-              <a:t>26.01.2021.</a:t>
+              <a:t>30.01.2021.</a:t>
             </a:fld>
             <a:endParaRPr lang="hr-HR"/>
           </a:p>
@@ -2937,7 +2937,7 @@
           <a:p>
             <a:fld id="{8E38A466-912F-4638-A4B7-9291465C9E2A}" type="datetimeFigureOut">
               <a:rPr lang="hr-HR" smtClean="0"/>
-              <a:t>26.01.2021.</a:t>
+              <a:t>30.01.2021.</a:t>
             </a:fld>
             <a:endParaRPr lang="hr-HR"/>
           </a:p>
@@ -5662,14 +5662,14 @@
           <p:nvPr>
             <p:extLst>
               <p:ext uri="{D42A27DB-BD31-4B8C-83A1-F6EECF244321}">
-                <p14:modId xmlns:p14="http://schemas.microsoft.com/office/powerpoint/2010/main" val="1368739728"/>
+                <p14:modId xmlns:p14="http://schemas.microsoft.com/office/powerpoint/2010/main" val="1982056820"/>
               </p:ext>
             </p:extLst>
           </p:nvPr>
         </p:nvGraphicFramePr>
         <p:xfrm>
           <a:off x="605473" y="2709104"/>
-          <a:ext cx="6563952" cy="1594068"/>
+          <a:ext cx="7862668" cy="1594068"/>
         </p:xfrm>
         <a:graphic>
           <a:graphicData uri="http://schemas.openxmlformats.org/drawingml/2006/table">
@@ -5678,34 +5678,41 @@
                 <a:tableStyleId>{5C22544A-7EE6-4342-B048-85BDC9FD1C3A}</a:tableStyleId>
               </a:tblPr>
               <a:tblGrid>
-                <a:gridCol w="1447458">
+                <a:gridCol w="1355830">
                   <a:extLst>
                     <a:ext uri="{9D8B030D-6E8A-4147-A177-3AD203B41FA5}">
                       <a16:colId xmlns:a16="http://schemas.microsoft.com/office/drawing/2014/main" val="3385109042"/>
                     </a:ext>
                   </a:extLst>
                 </a:gridCol>
-                <a:gridCol w="1456332">
+                <a:gridCol w="1364142">
                   <a:extLst>
                     <a:ext uri="{9D8B030D-6E8A-4147-A177-3AD203B41FA5}">
                       <a16:colId xmlns:a16="http://schemas.microsoft.com/office/drawing/2014/main" val="3137338918"/>
                     </a:ext>
                   </a:extLst>
                 </a:gridCol>
-                <a:gridCol w="1830081">
+                <a:gridCol w="1714232">
                   <a:extLst>
                     <a:ext uri="{9D8B030D-6E8A-4147-A177-3AD203B41FA5}">
                       <a16:colId xmlns:a16="http://schemas.microsoft.com/office/drawing/2014/main" val="2727507495"/>
                     </a:ext>
                   </a:extLst>
                 </a:gridCol>
-                <a:gridCol w="1830081">
+                <a:gridCol w="1714232">
                   <a:extLst>
                     <a:ext uri="{9D8B030D-6E8A-4147-A177-3AD203B41FA5}">
                       <a16:colId xmlns:a16="http://schemas.microsoft.com/office/drawing/2014/main" val="4160741929"/>
                     </a:ext>
                   </a:extLst>
                 </a:gridCol>
+                <a:gridCol w="1714232">
+                  <a:extLst>
+                    <a:ext uri="{9D8B030D-6E8A-4147-A177-3AD203B41FA5}">
+                      <a16:colId xmlns:a16="http://schemas.microsoft.com/office/drawing/2014/main" val="1119824273"/>
+                    </a:ext>
+                  </a:extLst>
+                </a:gridCol>
               </a:tblGrid>
               <a:tr h="481548">
                 <a:tc>
@@ -5762,6 +5769,21 @@
                       <a:r>
                         <a:rPr lang="hr-HR" dirty="0" err="1"/>
                         <a:t>Ticket_Status</a:t>
+                      </a:r>
+                      <a:endParaRPr lang="hr-HR" dirty="0"/>
+                    </a:p>
+                  </a:txBody>
+                  <a:tcPr/>
+                </a:tc>
+                <a:tc>
+                  <a:txBody>
+                    <a:bodyPr/>
+                    <a:lstStyle/>
+                    <a:p>
+                      <a:pPr algn="ctr"/>
+                      <a:r>
+                        <a:rPr lang="hr-HR" dirty="0" err="1"/>
+                        <a:t>Taxes</a:t>
                       </a:r>
                       <a:endParaRPr lang="hr-HR" dirty="0"/>
                     </a:p>
@@ -5834,6 +5856,20 @@
                   </a:txBody>
                   <a:tcPr/>
                 </a:tc>
+                <a:tc>
+                  <a:txBody>
+                    <a:bodyPr/>
+                    <a:lstStyle/>
+                    <a:p>
+                      <a:pPr algn="ctr"/>
+                      <a:r>
+                        <a:rPr lang="hr-HR" dirty="0"/>
+                        <a:t>32</a:t>
+                      </a:r>
+                    </a:p>
+                  </a:txBody>
+                  <a:tcPr/>
+                </a:tc>
                 <a:extLst>
                   <a:ext uri="{0D108BD9-81ED-4DB2-BD59-A6C34878D82A}">
                     <a16:rowId xmlns:a16="http://schemas.microsoft.com/office/drawing/2014/main" val="3920316459"/>
@@ -5900,6 +5936,20 @@
                   </a:txBody>
                   <a:tcPr/>
                 </a:tc>
+                <a:tc>
+                  <a:txBody>
+                    <a:bodyPr/>
+                    <a:lstStyle/>
+                    <a:p>
+                      <a:pPr algn="ctr"/>
+                      <a:r>
+                        <a:rPr lang="hr-HR" dirty="0"/>
+                        <a:t>50</a:t>
+                      </a:r>
+                    </a:p>
+                  </a:txBody>
+                  <a:tcPr/>
+                </a:tc>
                 <a:extLst>
                   <a:ext uri="{0D108BD9-81ED-4DB2-BD59-A6C34878D82A}">
                     <a16:rowId xmlns:a16="http://schemas.microsoft.com/office/drawing/2014/main" val="1966806956"/>
@@ -5962,6 +6012,21 @@
                         <a:rPr lang="hr-HR" dirty="0"/>
                         <a:t>0</a:t>
                       </a:r>
+                    </a:p>
+                  </a:txBody>
+                  <a:tcPr/>
+                </a:tc>
+                <a:tc>
+                  <a:txBody>
+                    <a:bodyPr/>
+                    <a:lstStyle/>
+                    <a:p>
+                      <a:pPr algn="ctr"/>
+                      <a:r>
+                        <a:rPr lang="hr-HR"/>
+                        <a:t>54</a:t>
+                      </a:r>
+                      <a:endParaRPr lang="hr-HR" dirty="0"/>
                     </a:p>
                   </a:txBody>
                   <a:tcPr/>
@@ -6060,7 +6125,7 @@
         </p:nvCxnSpPr>
         <p:spPr>
           <a:xfrm flipV="1">
-            <a:off x="6270611" y="4291771"/>
+            <a:off x="5912802" y="4291771"/>
             <a:ext cx="0" cy="532484"/>
           </a:xfrm>
           <a:prstGeom prst="straightConnector1">

</xml_diff>